<commit_message>
Submission of small data sample and presentation
</commit_message>
<xml_diff>
--- a/Fake Review Detection.pptx
+++ b/Fake Review Detection.pptx
@@ -208,7 +208,7 @@
           <a:p>
             <a:fld id="{1F86C33C-2941-4141-A149-BF8E4A074356}" type="datetimeFigureOut">
               <a:rPr lang="en-US" smtClean="0"/>
-              <a:t>5/8/2014</a:t>
+              <a:t>5/9/2014</a:t>
             </a:fld>
             <a:endParaRPr lang="en-US"/>
           </a:p>
@@ -754,7 +754,7 @@
           <a:p>
             <a:fld id="{2ED48E37-C62A-43A0-82BB-F3B5C67CCE8F}" type="datetimeFigureOut">
               <a:rPr lang="en-US" smtClean="0"/>
-              <a:t>5/8/2014</a:t>
+              <a:t>5/9/2014</a:t>
             </a:fld>
             <a:endParaRPr lang="en-US"/>
           </a:p>
@@ -919,7 +919,7 @@
           <a:p>
             <a:fld id="{2ED48E37-C62A-43A0-82BB-F3B5C67CCE8F}" type="datetimeFigureOut">
               <a:rPr lang="en-US" smtClean="0"/>
-              <a:t>5/8/2014</a:t>
+              <a:t>5/9/2014</a:t>
             </a:fld>
             <a:endParaRPr lang="en-US"/>
           </a:p>
@@ -1094,7 +1094,7 @@
           <a:p>
             <a:fld id="{2ED48E37-C62A-43A0-82BB-F3B5C67CCE8F}" type="datetimeFigureOut">
               <a:rPr lang="en-US" smtClean="0"/>
-              <a:t>5/8/2014</a:t>
+              <a:t>5/9/2014</a:t>
             </a:fld>
             <a:endParaRPr lang="en-US"/>
           </a:p>
@@ -1259,7 +1259,7 @@
           <a:p>
             <a:fld id="{2ED48E37-C62A-43A0-82BB-F3B5C67CCE8F}" type="datetimeFigureOut">
               <a:rPr lang="en-US" smtClean="0"/>
-              <a:t>5/8/2014</a:t>
+              <a:t>5/9/2014</a:t>
             </a:fld>
             <a:endParaRPr lang="en-US"/>
           </a:p>
@@ -1500,7 +1500,7 @@
           <a:p>
             <a:fld id="{2ED48E37-C62A-43A0-82BB-F3B5C67CCE8F}" type="datetimeFigureOut">
               <a:rPr lang="en-US" smtClean="0"/>
-              <a:t>5/8/2014</a:t>
+              <a:t>5/9/2014</a:t>
             </a:fld>
             <a:endParaRPr lang="en-US"/>
           </a:p>
@@ -1783,7 +1783,7 @@
           <a:p>
             <a:fld id="{2ED48E37-C62A-43A0-82BB-F3B5C67CCE8F}" type="datetimeFigureOut">
               <a:rPr lang="en-US" smtClean="0"/>
-              <a:t>5/8/2014</a:t>
+              <a:t>5/9/2014</a:t>
             </a:fld>
             <a:endParaRPr lang="en-US"/>
           </a:p>
@@ -2212,7 +2212,7 @@
           <a:p>
             <a:fld id="{2ED48E37-C62A-43A0-82BB-F3B5C67CCE8F}" type="datetimeFigureOut">
               <a:rPr lang="en-US" smtClean="0"/>
-              <a:t>5/8/2014</a:t>
+              <a:t>5/9/2014</a:t>
             </a:fld>
             <a:endParaRPr lang="en-US"/>
           </a:p>
@@ -2325,7 +2325,7 @@
           <a:p>
             <a:fld id="{2ED48E37-C62A-43A0-82BB-F3B5C67CCE8F}" type="datetimeFigureOut">
               <a:rPr lang="en-US" smtClean="0"/>
-              <a:t>5/8/2014</a:t>
+              <a:t>5/9/2014</a:t>
             </a:fld>
             <a:endParaRPr lang="en-US"/>
           </a:p>
@@ -2415,7 +2415,7 @@
           <a:p>
             <a:fld id="{2ED48E37-C62A-43A0-82BB-F3B5C67CCE8F}" type="datetimeFigureOut">
               <a:rPr lang="en-US" smtClean="0"/>
-              <a:t>5/8/2014</a:t>
+              <a:t>5/9/2014</a:t>
             </a:fld>
             <a:endParaRPr lang="en-US"/>
           </a:p>
@@ -2604,7 +2604,7 @@
           <a:p>
             <a:fld id="{2ED48E37-C62A-43A0-82BB-F3B5C67CCE8F}" type="datetimeFigureOut">
               <a:rPr lang="en-US" smtClean="0"/>
-              <a:t>5/8/2014</a:t>
+              <a:t>5/9/2014</a:t>
             </a:fld>
             <a:endParaRPr lang="en-US"/>
           </a:p>
@@ -2922,7 +2922,7 @@
           <a:p>
             <a:fld id="{2ED48E37-C62A-43A0-82BB-F3B5C67CCE8F}" type="datetimeFigureOut">
               <a:rPr lang="en-US" smtClean="0"/>
-              <a:t>5/8/2014</a:t>
+              <a:t>5/9/2014</a:t>
             </a:fld>
             <a:endParaRPr lang="en-US"/>
           </a:p>
@@ -3301,7 +3301,7 @@
           <a:p>
             <a:fld id="{2ED48E37-C62A-43A0-82BB-F3B5C67CCE8F}" type="datetimeFigureOut">
               <a:rPr lang="en-US" smtClean="0"/>
-              <a:t>5/8/2014</a:t>
+              <a:t>5/9/2014</a:t>
             </a:fld>
             <a:endParaRPr lang="en-US"/>
           </a:p>
@@ -3758,21 +3758,8 @@
             </a:pPr>
             <a:r>
               <a:rPr lang="en-US" dirty="0" smtClean="0"/>
-              <a:t>Fake </a:t>
-            </a:r>
-            <a:r>
-              <a:rPr lang="en-US" dirty="0" smtClean="0"/>
-              <a:t>reviewers are </a:t>
-            </a:r>
-            <a:r>
-              <a:rPr lang="en-US" dirty="0" smtClean="0"/>
-              <a:t>paid to increase/decrease business ratings. Small review and an extreme rating might </a:t>
-            </a:r>
-            <a:r>
-              <a:rPr lang="en-US" dirty="0" smtClean="0"/>
-              <a:t>be a significant indicator.</a:t>
-            </a:r>
-            <a:endParaRPr lang="en-US" dirty="0" smtClean="0"/>
+              <a:t>Fake reviewers are paid to increase/decrease business ratings. Small review and an extreme rating might be a significant indicator.</a:t>
+            </a:r>
           </a:p>
           <a:p>
             <a:pPr marL="114300" indent="0">
@@ -3813,15 +3800,7 @@
             </a:r>
             <a:r>
               <a:rPr lang="en-US" dirty="0" smtClean="0"/>
-              <a:t>) might </a:t>
-            </a:r>
-            <a:r>
-              <a:rPr lang="en-US" dirty="0" smtClean="0"/>
-              <a:t>indicate an attempt </a:t>
-            </a:r>
-            <a:r>
-              <a:rPr lang="en-US" dirty="0" smtClean="0"/>
-              <a:t>to influence the ratings.</a:t>
+              <a:t>) might indicate an attempt to influence the ratings.</a:t>
             </a:r>
           </a:p>
           <a:p>
@@ -4289,7 +4268,6 @@
               <a:rPr lang="en-US" dirty="0" smtClean="0"/>
               <a:t>–</a:t>
             </a:r>
-            <a:endParaRPr lang="en-US" dirty="0" smtClean="0"/>
           </a:p>
           <a:p>
             <a:pPr marL="114300" indent="0">
@@ -4318,11 +4296,7 @@
             </a:pPr>
             <a:r>
               <a:rPr lang="en-US" u="sng" dirty="0" smtClean="0"/>
-              <a:t>Measure </a:t>
-            </a:r>
-            <a:r>
-              <a:rPr lang="en-US" u="sng" dirty="0" smtClean="0"/>
-              <a:t>used </a:t>
+              <a:t>Measure used </a:t>
             </a:r>
             <a:r>
               <a:rPr lang="en-US" dirty="0" smtClean="0"/>
@@ -4521,7 +4495,6 @@
               <a:rPr lang="en-US" dirty="0" smtClean="0"/>
               <a:t> - Linear</a:t>
             </a:r>
-            <a:endParaRPr lang="en-US" dirty="0" smtClean="0"/>
           </a:p>
           <a:p>
             <a:pPr marL="114300" indent="0">
@@ -4571,11 +4544,7 @@
             </a:r>
             <a:r>
               <a:rPr lang="en-US" dirty="0" smtClean="0"/>
-              <a:t> – 25 </a:t>
-            </a:r>
-            <a:r>
-              <a:rPr lang="en-US" dirty="0" smtClean="0"/>
-              <a:t>seconds</a:t>
+              <a:t> – 25 seconds</a:t>
             </a:r>
           </a:p>
           <a:p>
@@ -5940,27 +5909,7 @@
           <a:p>
             <a:r>
               <a:rPr lang="en-US" dirty="0" smtClean="0"/>
-              <a:t>There are </a:t>
-            </a:r>
-            <a:r>
-              <a:rPr lang="en-US" dirty="0" smtClean="0"/>
-              <a:t>probably other features like </a:t>
-            </a:r>
-            <a:r>
-              <a:rPr lang="en-US" dirty="0" smtClean="0"/>
-              <a:t>IP </a:t>
-            </a:r>
-            <a:r>
-              <a:rPr lang="en-US" dirty="0" smtClean="0"/>
-              <a:t>addresses, </a:t>
-            </a:r>
-            <a:r>
-              <a:rPr lang="en-US" dirty="0" smtClean="0"/>
-              <a:t>server </a:t>
-            </a:r>
-            <a:r>
-              <a:rPr lang="en-US" dirty="0" smtClean="0"/>
-              <a:t>logs that are being used to filter out ‘suspicious’ reviews by Yelp. Would like to train classifier with these features.</a:t>
+              <a:t>There are probably other features like IP addresses, server logs that are being used to filter out ‘suspicious’ reviews by Yelp. Would like to train classifier with these features.</a:t>
             </a:r>
           </a:p>
           <a:p>
@@ -6605,15 +6554,7 @@
                   <a:srgbClr val="002060"/>
                 </a:solidFill>
               </a:rPr>
-              <a:t>FAKE</a:t>
-            </a:r>
-            <a:r>
-              <a:rPr lang="en-US" sz="5800" dirty="0" smtClean="0">
-                <a:solidFill>
-                  <a:srgbClr val="002060"/>
-                </a:solidFill>
-              </a:rPr>
-              <a:t>!!</a:t>
+              <a:t>FAKE!!</a:t>
             </a:r>
             <a:endParaRPr lang="en-US" sz="5800" dirty="0">
               <a:solidFill>
@@ -7247,19 +7188,7 @@
           <a:p>
             <a:r>
               <a:rPr lang="en-US" dirty="0" smtClean="0"/>
-              <a:t>Requested Yelp to provide filtered reviews data. </a:t>
-            </a:r>
-            <a:r>
-              <a:rPr lang="en-US" dirty="0" smtClean="0"/>
-              <a:t>No luck as it </a:t>
-            </a:r>
-            <a:r>
-              <a:rPr lang="en-US" dirty="0" smtClean="0"/>
-              <a:t>falls under sensitive </a:t>
-            </a:r>
-            <a:r>
-              <a:rPr lang="en-US" dirty="0" smtClean="0"/>
-              <a:t>category. </a:t>
+              <a:t>Requested Yelp to provide filtered reviews data. No luck as it falls under sensitive category. </a:t>
             </a:r>
             <a:r>
               <a:rPr lang="en-US" dirty="0" smtClean="0">
@@ -7656,10 +7585,48 @@
         <p:spPr>
           <a:xfrm>
             <a:off x="152400" y="1066800"/>
-            <a:ext cx="8153400" cy="5486400"/>
+            <a:ext cx="7467600" cy="5024927"/>
           </a:xfrm>
         </p:spPr>
       </p:pic>
+      <p:sp>
+        <p:nvSpPr>
+          <p:cNvPr id="3" name="TextBox 2"/>
+          <p:cNvSpPr txBox="1"/>
+          <p:nvPr/>
+        </p:nvSpPr>
+        <p:spPr>
+          <a:xfrm>
+            <a:off x="152400" y="6172200"/>
+            <a:ext cx="7467600" cy="646331"/>
+          </a:xfrm>
+          <a:prstGeom prst="rect">
+            <a:avLst/>
+          </a:prstGeom>
+          <a:noFill/>
+        </p:spPr>
+        <p:txBody>
+          <a:bodyPr wrap="square" rtlCol="0">
+            <a:spAutoFit/>
+          </a:bodyPr>
+          <a:lstStyle/>
+          <a:p>
+            <a:r>
+              <a:rPr lang="en-US" dirty="0" smtClean="0"/>
+              <a:t>Yelp measure to prevent DDOS attacks. </a:t>
+            </a:r>
+            <a:r>
+              <a:rPr lang="en-US" dirty="0" err="1" smtClean="0"/>
+              <a:t>Webscrapping</a:t>
+            </a:r>
+            <a:r>
+              <a:rPr lang="en-US" dirty="0" smtClean="0"/>
+              <a:t> speed has to be slow to avoid this message.</a:t>
+            </a:r>
+            <a:endParaRPr lang="en-US" dirty="0"/>
+          </a:p>
+        </p:txBody>
+      </p:sp>
     </p:spTree>
     <p:extLst>
       <p:ext uri="{BB962C8B-B14F-4D97-AF65-F5344CB8AC3E}">
@@ -7840,7 +7807,6 @@
               <a:rPr lang="en-US" u="sng" dirty="0" smtClean="0"/>
               <a:t>Exclamations!!!!!</a:t>
             </a:r>
-            <a:endParaRPr lang="en-US" u="sng" dirty="0" smtClean="0"/>
           </a:p>
         </p:txBody>
       </p:sp>

</xml_diff>